<commit_message>
Final Report and Powerpoint in PDF format (so people can view on github)
</commit_message>
<xml_diff>
--- a/DSE220 Final Project/DSE220 Final Project Presentation.pptx
+++ b/DSE220 Final Project/DSE220 Final Project Presentation.pptx
@@ -3800,7 +3800,7 @@
           <a:p>
             <a:fld id="{CA401026-7639-C740-8F27-B502A4A06F60}" type="datetimeFigureOut">
               <a:rPr lang="en-US" smtClean="0"/>
-              <a:t>6/10/16</a:t>
+              <a:t>6/26/16</a:t>
             </a:fld>
             <a:endParaRPr lang="en-US"/>
           </a:p>
@@ -4291,7 +4291,7 @@
           <a:p>
             <a:fld id="{E7A71149-2CB9-4E49-866B-8310B95B75FD}" type="datetimeFigureOut">
               <a:rPr lang="en-US" smtClean="0"/>
-              <a:t>6/10/16</a:t>
+              <a:t>6/26/16</a:t>
             </a:fld>
             <a:endParaRPr lang="en-US"/>
           </a:p>
@@ -4461,7 +4461,7 @@
           <a:p>
             <a:fld id="{E7A71149-2CB9-4E49-866B-8310B95B75FD}" type="datetimeFigureOut">
               <a:rPr lang="en-US" smtClean="0"/>
-              <a:t>6/10/16</a:t>
+              <a:t>6/26/16</a:t>
             </a:fld>
             <a:endParaRPr lang="en-US"/>
           </a:p>
@@ -4641,7 +4641,7 @@
           <a:p>
             <a:fld id="{E7A71149-2CB9-4E49-866B-8310B95B75FD}" type="datetimeFigureOut">
               <a:rPr lang="en-US" smtClean="0"/>
-              <a:t>6/10/16</a:t>
+              <a:t>6/26/16</a:t>
             </a:fld>
             <a:endParaRPr lang="en-US"/>
           </a:p>
@@ -4811,7 +4811,7 @@
           <a:p>
             <a:fld id="{E7A71149-2CB9-4E49-866B-8310B95B75FD}" type="datetimeFigureOut">
               <a:rPr lang="en-US" smtClean="0"/>
-              <a:t>6/10/16</a:t>
+              <a:t>6/26/16</a:t>
             </a:fld>
             <a:endParaRPr lang="en-US"/>
           </a:p>
@@ -5057,7 +5057,7 @@
           <a:p>
             <a:fld id="{E7A71149-2CB9-4E49-866B-8310B95B75FD}" type="datetimeFigureOut">
               <a:rPr lang="en-US" smtClean="0"/>
-              <a:t>6/10/16</a:t>
+              <a:t>6/26/16</a:t>
             </a:fld>
             <a:endParaRPr lang="en-US"/>
           </a:p>
@@ -5289,7 +5289,7 @@
           <a:p>
             <a:fld id="{E7A71149-2CB9-4E49-866B-8310B95B75FD}" type="datetimeFigureOut">
               <a:rPr lang="en-US" smtClean="0"/>
-              <a:t>6/10/16</a:t>
+              <a:t>6/26/16</a:t>
             </a:fld>
             <a:endParaRPr lang="en-US"/>
           </a:p>
@@ -5656,7 +5656,7 @@
           <a:p>
             <a:fld id="{E7A71149-2CB9-4E49-866B-8310B95B75FD}" type="datetimeFigureOut">
               <a:rPr lang="en-US" smtClean="0"/>
-              <a:t>6/10/16</a:t>
+              <a:t>6/26/16</a:t>
             </a:fld>
             <a:endParaRPr lang="en-US"/>
           </a:p>
@@ -5774,7 +5774,7 @@
           <a:p>
             <a:fld id="{E7A71149-2CB9-4E49-866B-8310B95B75FD}" type="datetimeFigureOut">
               <a:rPr lang="en-US" smtClean="0"/>
-              <a:t>6/10/16</a:t>
+              <a:t>6/26/16</a:t>
             </a:fld>
             <a:endParaRPr lang="en-US"/>
           </a:p>
@@ -5869,7 +5869,7 @@
           <a:p>
             <a:fld id="{E7A71149-2CB9-4E49-866B-8310B95B75FD}" type="datetimeFigureOut">
               <a:rPr lang="en-US" smtClean="0"/>
-              <a:t>6/10/16</a:t>
+              <a:t>6/26/16</a:t>
             </a:fld>
             <a:endParaRPr lang="en-US"/>
           </a:p>
@@ -6146,7 +6146,7 @@
           <a:p>
             <a:fld id="{E7A71149-2CB9-4E49-866B-8310B95B75FD}" type="datetimeFigureOut">
               <a:rPr lang="en-US" smtClean="0"/>
-              <a:t>6/10/16</a:t>
+              <a:t>6/26/16</a:t>
             </a:fld>
             <a:endParaRPr lang="en-US"/>
           </a:p>
@@ -6399,7 +6399,7 @@
           <a:p>
             <a:fld id="{E7A71149-2CB9-4E49-866B-8310B95B75FD}" type="datetimeFigureOut">
               <a:rPr lang="en-US" smtClean="0"/>
-              <a:t>6/10/16</a:t>
+              <a:t>6/26/16</a:t>
             </a:fld>
             <a:endParaRPr lang="en-US"/>
           </a:p>
@@ -6617,7 +6617,7 @@
           <a:p>
             <a:fld id="{E7A71149-2CB9-4E49-866B-8310B95B75FD}" type="datetimeFigureOut">
               <a:rPr lang="en-US" smtClean="0"/>
-              <a:t>6/10/16</a:t>
+              <a:t>6/26/16</a:t>
             </a:fld>
             <a:endParaRPr lang="en-US"/>
           </a:p>
@@ -8386,7 +8386,7 @@
         </p:nvSpPr>
         <p:spPr>
           <a:xfrm>
-            <a:off x="838200" y="1475430"/>
+            <a:off x="332363" y="1397610"/>
             <a:ext cx="10515600" cy="4351338"/>
           </a:xfrm>
         </p:spPr>
@@ -8403,13 +8403,12 @@
             <a:pPr lvl="1"/>
             <a:r>
               <a:rPr lang="en-US" dirty="0" smtClean="0"/>
-              <a:t>C?</a:t>
-            </a:r>
-          </a:p>
-          <a:p>
-            <a:pPr marL="0" indent="0">
-              <a:buNone/>
-            </a:pPr>
+              <a:t>C</a:t>
+            </a:r>
+            <a:r>
+              <a:rPr lang="en-US" dirty="0" smtClean="0"/>
+              <a:t>?</a:t>
+            </a:r>
             <a:endParaRPr lang="en-US" b="1" dirty="0" smtClean="0"/>
           </a:p>
           <a:p>
@@ -8500,7 +8499,7 @@
         </p:blipFill>
         <p:spPr bwMode="auto">
           <a:xfrm>
-            <a:off x="6835617" y="4130773"/>
+            <a:off x="7049622" y="4130773"/>
             <a:ext cx="5102299" cy="2546252"/>
           </a:xfrm>
           <a:prstGeom prst="rect">
@@ -8528,7 +8527,7 @@
         </p:nvSpPr>
         <p:spPr>
           <a:xfrm>
-            <a:off x="7758415" y="3852459"/>
+            <a:off x="7972420" y="3852459"/>
             <a:ext cx="3618219" cy="278314"/>
           </a:xfrm>
           <a:prstGeom prst="rect">
@@ -8720,7 +8719,7 @@
         </p:nvSpPr>
         <p:spPr>
           <a:xfrm rot="16200000">
-            <a:off x="5590653" y="5216957"/>
+            <a:off x="5804658" y="5216957"/>
             <a:ext cx="2198038" cy="246221"/>
           </a:xfrm>
           <a:prstGeom prst="rect">
@@ -8750,7 +8749,7 @@
         </p:nvSpPr>
         <p:spPr>
           <a:xfrm>
-            <a:off x="8747869" y="6657185"/>
+            <a:off x="8961874" y="6657185"/>
             <a:ext cx="1223412" cy="246221"/>
           </a:xfrm>
           <a:prstGeom prst="rect">

</xml_diff>